<commit_message>
BNL slides. First draft.
</commit_message>
<xml_diff>
--- a/2013-XSEDE-CDI.pptx
+++ b/2013-XSEDE-CDI.pptx
@@ -182,7 +182,7 @@
           <a:blip r:embed="rId2">
             <a:extLst>
               <a:ext uri="{28A0092B-C50C-407E-A947-70E740481C1C}">
-                <a14:useLocalDpi xmlns:a14="http://schemas.microsoft.com/office/drawing/2010/main" xmlns:p="http://schemas.openxmlformats.org/presentationml/2006/main" xmlns:r="http://schemas.openxmlformats.org/officeDocument/2006/relationships" xmlns:a="http://schemas.openxmlformats.org/drawingml/2006/main" xmlns="" val="0"/>
+                <a14:useLocalDpi xmlns="" xmlns:a="http://schemas.openxmlformats.org/drawingml/2006/main" xmlns:r="http://schemas.openxmlformats.org/officeDocument/2006/relationships" xmlns:p="http://schemas.openxmlformats.org/presentationml/2006/main" xmlns:a14="http://schemas.microsoft.com/office/drawing/2010/main" xmlns:mv="urn:schemas-microsoft-com:mac:vml" xmlns:mc="http://schemas.openxmlformats.org/markup-compatibility/2006" val="0"/>
               </a:ext>
             </a:extLst>
           </a:blip>
@@ -205,14 +205,14 @@
           </a:ln>
           <a:extLst>
             <a:ext uri="{909E8E84-426E-40dd-AFC4-6F175D3DCCD1}">
-              <a14:hiddenFill xmlns:a14="http://schemas.microsoft.com/office/drawing/2010/main" xmlns:p="http://schemas.openxmlformats.org/presentationml/2006/main" xmlns:r="http://schemas.openxmlformats.org/officeDocument/2006/relationships" xmlns:a="http://schemas.openxmlformats.org/drawingml/2006/main" xmlns="">
+              <a14:hiddenFill xmlns="" xmlns:a="http://schemas.openxmlformats.org/drawingml/2006/main" xmlns:r="http://schemas.openxmlformats.org/officeDocument/2006/relationships" xmlns:p="http://schemas.openxmlformats.org/presentationml/2006/main" xmlns:a14="http://schemas.microsoft.com/office/drawing/2010/main" xmlns:mv="urn:schemas-microsoft-com:mac:vml" xmlns:mc="http://schemas.openxmlformats.org/markup-compatibility/2006">
                 <a:solidFill>
                   <a:srgbClr val="FFFFFF"/>
                 </a:solidFill>
               </a14:hiddenFill>
             </a:ext>
             <a:ext uri="{91240B29-F687-4f45-9708-019B960494DF}">
-              <a14:hiddenLine xmlns:a14="http://schemas.microsoft.com/office/drawing/2010/main" xmlns:p="http://schemas.openxmlformats.org/presentationml/2006/main" xmlns:r="http://schemas.openxmlformats.org/officeDocument/2006/relationships" xmlns:a="http://schemas.openxmlformats.org/drawingml/2006/main" xmlns="" w="9525">
+              <a14:hiddenLine xmlns="" xmlns:a="http://schemas.openxmlformats.org/drawingml/2006/main" xmlns:r="http://schemas.openxmlformats.org/officeDocument/2006/relationships" xmlns:p="http://schemas.openxmlformats.org/presentationml/2006/main" xmlns:a14="http://schemas.microsoft.com/office/drawing/2010/main" xmlns:mv="urn:schemas-microsoft-com:mac:vml" xmlns:mc="http://schemas.openxmlformats.org/markup-compatibility/2006" w="9525">
                 <a:solidFill>
                   <a:srgbClr val="000000"/>
                 </a:solidFill>
@@ -301,7 +301,7 @@
     </p:spTree>
     <p:extLst>
       <p:ext uri="{BB962C8B-B14F-4D97-AF65-F5344CB8AC3E}">
-        <p14:creationId xmlns:p14="http://schemas.microsoft.com/office/powerpoint/2010/main" xmlns:p="http://schemas.openxmlformats.org/presentationml/2006/main" xmlns:r="http://schemas.openxmlformats.org/officeDocument/2006/relationships" xmlns:a="http://schemas.openxmlformats.org/drawingml/2006/main" xmlns="" val="67712113"/>
+        <p14:creationId xmlns="" xmlns:a="http://schemas.openxmlformats.org/drawingml/2006/main" xmlns:r="http://schemas.openxmlformats.org/officeDocument/2006/relationships" xmlns:p="http://schemas.openxmlformats.org/presentationml/2006/main" xmlns:p14="http://schemas.microsoft.com/office/powerpoint/2010/main" xmlns:mv="urn:schemas-microsoft-com:mac:vml" xmlns:mc="http://schemas.openxmlformats.org/markup-compatibility/2006" val="67712113"/>
       </p:ext>
     </p:extLst>
   </p:cSld>
@@ -441,7 +441,7 @@
     </p:spTree>
     <p:extLst>
       <p:ext uri="{BB962C8B-B14F-4D97-AF65-F5344CB8AC3E}">
-        <p14:creationId xmlns:p14="http://schemas.microsoft.com/office/powerpoint/2010/main" xmlns:p="http://schemas.openxmlformats.org/presentationml/2006/main" xmlns:r="http://schemas.openxmlformats.org/officeDocument/2006/relationships" xmlns:a="http://schemas.openxmlformats.org/drawingml/2006/main" xmlns="" val="1921024505"/>
+        <p14:creationId xmlns="" xmlns:a="http://schemas.openxmlformats.org/drawingml/2006/main" xmlns:r="http://schemas.openxmlformats.org/officeDocument/2006/relationships" xmlns:p="http://schemas.openxmlformats.org/presentationml/2006/main" xmlns:p14="http://schemas.microsoft.com/office/powerpoint/2010/main" xmlns:mv="urn:schemas-microsoft-com:mac:vml" xmlns:mc="http://schemas.openxmlformats.org/markup-compatibility/2006" val="1921024505"/>
       </p:ext>
     </p:extLst>
   </p:cSld>
@@ -591,7 +591,7 @@
     </p:spTree>
     <p:extLst>
       <p:ext uri="{BB962C8B-B14F-4D97-AF65-F5344CB8AC3E}">
-        <p14:creationId xmlns:p14="http://schemas.microsoft.com/office/powerpoint/2010/main" xmlns:p="http://schemas.openxmlformats.org/presentationml/2006/main" xmlns:r="http://schemas.openxmlformats.org/officeDocument/2006/relationships" xmlns:a="http://schemas.openxmlformats.org/drawingml/2006/main" xmlns="" val="2214459555"/>
+        <p14:creationId xmlns="" xmlns:a="http://schemas.openxmlformats.org/drawingml/2006/main" xmlns:r="http://schemas.openxmlformats.org/officeDocument/2006/relationships" xmlns:p="http://schemas.openxmlformats.org/presentationml/2006/main" xmlns:p14="http://schemas.microsoft.com/office/powerpoint/2010/main" xmlns:mv="urn:schemas-microsoft-com:mac:vml" xmlns:mc="http://schemas.openxmlformats.org/markup-compatibility/2006" val="2214459555"/>
       </p:ext>
     </p:extLst>
   </p:cSld>
@@ -731,7 +731,7 @@
     </p:spTree>
     <p:extLst>
       <p:ext uri="{BB962C8B-B14F-4D97-AF65-F5344CB8AC3E}">
-        <p14:creationId xmlns:p14="http://schemas.microsoft.com/office/powerpoint/2010/main" xmlns:p="http://schemas.openxmlformats.org/presentationml/2006/main" xmlns:r="http://schemas.openxmlformats.org/officeDocument/2006/relationships" xmlns:a="http://schemas.openxmlformats.org/drawingml/2006/main" xmlns="" val="3770358045"/>
+        <p14:creationId xmlns="" xmlns:a="http://schemas.openxmlformats.org/drawingml/2006/main" xmlns:r="http://schemas.openxmlformats.org/officeDocument/2006/relationships" xmlns:p="http://schemas.openxmlformats.org/presentationml/2006/main" xmlns:p14="http://schemas.microsoft.com/office/powerpoint/2010/main" xmlns:mv="urn:schemas-microsoft-com:mac:vml" xmlns:mc="http://schemas.openxmlformats.org/markup-compatibility/2006" val="3770358045"/>
       </p:ext>
     </p:extLst>
   </p:cSld>
@@ -893,7 +893,7 @@
     </p:spTree>
     <p:extLst>
       <p:ext uri="{BB962C8B-B14F-4D97-AF65-F5344CB8AC3E}">
-        <p14:creationId xmlns:p14="http://schemas.microsoft.com/office/powerpoint/2010/main" xmlns:p="http://schemas.openxmlformats.org/presentationml/2006/main" xmlns:r="http://schemas.openxmlformats.org/officeDocument/2006/relationships" xmlns:a="http://schemas.openxmlformats.org/drawingml/2006/main" xmlns="" val="1862549300"/>
+        <p14:creationId xmlns="" xmlns:a="http://schemas.openxmlformats.org/drawingml/2006/main" xmlns:r="http://schemas.openxmlformats.org/officeDocument/2006/relationships" xmlns:p="http://schemas.openxmlformats.org/presentationml/2006/main" xmlns:p14="http://schemas.microsoft.com/office/powerpoint/2010/main" xmlns:mv="urn:schemas-microsoft-com:mac:vml" xmlns:mc="http://schemas.openxmlformats.org/markup-compatibility/2006" val="1862549300"/>
       </p:ext>
     </p:extLst>
   </p:cSld>
@@ -1151,7 +1151,7 @@
     </p:spTree>
     <p:extLst>
       <p:ext uri="{BB962C8B-B14F-4D97-AF65-F5344CB8AC3E}">
-        <p14:creationId xmlns:p14="http://schemas.microsoft.com/office/powerpoint/2010/main" xmlns:p="http://schemas.openxmlformats.org/presentationml/2006/main" xmlns:r="http://schemas.openxmlformats.org/officeDocument/2006/relationships" xmlns:a="http://schemas.openxmlformats.org/drawingml/2006/main" xmlns="" val="3471441873"/>
+        <p14:creationId xmlns="" xmlns:a="http://schemas.openxmlformats.org/drawingml/2006/main" xmlns:r="http://schemas.openxmlformats.org/officeDocument/2006/relationships" xmlns:p="http://schemas.openxmlformats.org/presentationml/2006/main" xmlns:p14="http://schemas.microsoft.com/office/powerpoint/2010/main" xmlns:mv="urn:schemas-microsoft-com:mac:vml" xmlns:mc="http://schemas.openxmlformats.org/markup-compatibility/2006" val="3471441873"/>
       </p:ext>
     </p:extLst>
   </p:cSld>
@@ -1548,7 +1548,7 @@
     </p:spTree>
     <p:extLst>
       <p:ext uri="{BB962C8B-B14F-4D97-AF65-F5344CB8AC3E}">
-        <p14:creationId xmlns:p14="http://schemas.microsoft.com/office/powerpoint/2010/main" xmlns:p="http://schemas.openxmlformats.org/presentationml/2006/main" xmlns:r="http://schemas.openxmlformats.org/officeDocument/2006/relationships" xmlns:a="http://schemas.openxmlformats.org/drawingml/2006/main" xmlns="" val="1563413478"/>
+        <p14:creationId xmlns="" xmlns:a="http://schemas.openxmlformats.org/drawingml/2006/main" xmlns:r="http://schemas.openxmlformats.org/officeDocument/2006/relationships" xmlns:p="http://schemas.openxmlformats.org/presentationml/2006/main" xmlns:p14="http://schemas.microsoft.com/office/powerpoint/2010/main" xmlns:mv="urn:schemas-microsoft-com:mac:vml" xmlns:mc="http://schemas.openxmlformats.org/markup-compatibility/2006" val="1563413478"/>
       </p:ext>
     </p:extLst>
   </p:cSld>
@@ -1636,7 +1636,7 @@
     </p:spTree>
     <p:extLst>
       <p:ext uri="{BB962C8B-B14F-4D97-AF65-F5344CB8AC3E}">
-        <p14:creationId xmlns:p14="http://schemas.microsoft.com/office/powerpoint/2010/main" xmlns:p="http://schemas.openxmlformats.org/presentationml/2006/main" xmlns:r="http://schemas.openxmlformats.org/officeDocument/2006/relationships" xmlns:a="http://schemas.openxmlformats.org/drawingml/2006/main" xmlns="" val="3370480776"/>
+        <p14:creationId xmlns="" xmlns:a="http://schemas.openxmlformats.org/drawingml/2006/main" xmlns:r="http://schemas.openxmlformats.org/officeDocument/2006/relationships" xmlns:p="http://schemas.openxmlformats.org/presentationml/2006/main" xmlns:p14="http://schemas.microsoft.com/office/powerpoint/2010/main" xmlns:mv="urn:schemas-microsoft-com:mac:vml" xmlns:mc="http://schemas.openxmlformats.org/markup-compatibility/2006" val="3370480776"/>
       </p:ext>
     </p:extLst>
   </p:cSld>
@@ -1701,7 +1701,7 @@
     </p:spTree>
     <p:extLst>
       <p:ext uri="{BB962C8B-B14F-4D97-AF65-F5344CB8AC3E}">
-        <p14:creationId xmlns:p14="http://schemas.microsoft.com/office/powerpoint/2010/main" xmlns:p="http://schemas.openxmlformats.org/presentationml/2006/main" xmlns:r="http://schemas.openxmlformats.org/officeDocument/2006/relationships" xmlns:a="http://schemas.openxmlformats.org/drawingml/2006/main" xmlns="" val="2668922964"/>
+        <p14:creationId xmlns="" xmlns:a="http://schemas.openxmlformats.org/drawingml/2006/main" xmlns:r="http://schemas.openxmlformats.org/officeDocument/2006/relationships" xmlns:p="http://schemas.openxmlformats.org/presentationml/2006/main" xmlns:p14="http://schemas.microsoft.com/office/powerpoint/2010/main" xmlns:mv="urn:schemas-microsoft-com:mac:vml" xmlns:mc="http://schemas.openxmlformats.org/markup-compatibility/2006" val="2668922964"/>
       </p:ext>
     </p:extLst>
   </p:cSld>
@@ -1948,7 +1948,7 @@
     </p:spTree>
     <p:extLst>
       <p:ext uri="{BB962C8B-B14F-4D97-AF65-F5344CB8AC3E}">
-        <p14:creationId xmlns:p14="http://schemas.microsoft.com/office/powerpoint/2010/main" xmlns:p="http://schemas.openxmlformats.org/presentationml/2006/main" xmlns:r="http://schemas.openxmlformats.org/officeDocument/2006/relationships" xmlns:a="http://schemas.openxmlformats.org/drawingml/2006/main" xmlns="" val="1731634667"/>
+        <p14:creationId xmlns="" xmlns:a="http://schemas.openxmlformats.org/drawingml/2006/main" xmlns:r="http://schemas.openxmlformats.org/officeDocument/2006/relationships" xmlns:p="http://schemas.openxmlformats.org/presentationml/2006/main" xmlns:p14="http://schemas.microsoft.com/office/powerpoint/2010/main" xmlns:mv="urn:schemas-microsoft-com:mac:vml" xmlns:mc="http://schemas.openxmlformats.org/markup-compatibility/2006" val="1731634667"/>
       </p:ext>
     </p:extLst>
   </p:cSld>
@@ -2175,7 +2175,7 @@
     </p:spTree>
     <p:extLst>
       <p:ext uri="{BB962C8B-B14F-4D97-AF65-F5344CB8AC3E}">
-        <p14:creationId xmlns:p14="http://schemas.microsoft.com/office/powerpoint/2010/main" xmlns:p="http://schemas.openxmlformats.org/presentationml/2006/main" xmlns:r="http://schemas.openxmlformats.org/officeDocument/2006/relationships" xmlns:a="http://schemas.openxmlformats.org/drawingml/2006/main" xmlns="" val="2345041706"/>
+        <p14:creationId xmlns="" xmlns:a="http://schemas.openxmlformats.org/drawingml/2006/main" xmlns:r="http://schemas.openxmlformats.org/officeDocument/2006/relationships" xmlns:p="http://schemas.openxmlformats.org/presentationml/2006/main" xmlns:p14="http://schemas.microsoft.com/office/powerpoint/2010/main" xmlns:mv="urn:schemas-microsoft-com:mac:vml" xmlns:mc="http://schemas.openxmlformats.org/markup-compatibility/2006" val="2345041706"/>
       </p:ext>
     </p:extLst>
   </p:cSld>
@@ -2234,14 +2234,14 @@
           </a:ln>
           <a:extLst>
             <a:ext uri="{909E8E84-426E-40dd-AFC4-6F175D3DCCD1}">
-              <a14:hiddenFill xmlns:a14="http://schemas.microsoft.com/office/drawing/2010/main" xmlns:p="http://schemas.openxmlformats.org/presentationml/2006/main" xmlns:r="http://schemas.openxmlformats.org/officeDocument/2006/relationships" xmlns:a="http://schemas.openxmlformats.org/drawingml/2006/main" xmlns="">
+              <a14:hiddenFill xmlns="" xmlns:a="http://schemas.openxmlformats.org/drawingml/2006/main" xmlns:r="http://schemas.openxmlformats.org/officeDocument/2006/relationships" xmlns:p="http://schemas.openxmlformats.org/presentationml/2006/main" xmlns:a14="http://schemas.microsoft.com/office/drawing/2010/main" xmlns:mv="urn:schemas-microsoft-com:mac:vml" xmlns:mc="http://schemas.openxmlformats.org/markup-compatibility/2006">
                 <a:solidFill>
                   <a:srgbClr val="FFFFFF"/>
                 </a:solidFill>
               </a14:hiddenFill>
             </a:ext>
             <a:ext uri="{91240B29-F687-4f45-9708-019B960494DF}">
-              <a14:hiddenLine xmlns:a14="http://schemas.microsoft.com/office/drawing/2010/main" xmlns:p="http://schemas.openxmlformats.org/presentationml/2006/main" xmlns:r="http://schemas.openxmlformats.org/officeDocument/2006/relationships" xmlns:a="http://schemas.openxmlformats.org/drawingml/2006/main" xmlns="" w="9525">
+              <a14:hiddenLine xmlns="" xmlns:a="http://schemas.openxmlformats.org/drawingml/2006/main" xmlns:r="http://schemas.openxmlformats.org/officeDocument/2006/relationships" xmlns:p="http://schemas.openxmlformats.org/presentationml/2006/main" xmlns:a14="http://schemas.microsoft.com/office/drawing/2010/main" xmlns:mv="urn:schemas-microsoft-com:mac:vml" xmlns:mc="http://schemas.openxmlformats.org/markup-compatibility/2006" w="9525">
                 <a:solidFill>
                   <a:srgbClr val="000000"/>
                 </a:solidFill>
@@ -2292,14 +2292,14 @@
           </a:ln>
           <a:extLst>
             <a:ext uri="{909E8E84-426E-40dd-AFC4-6F175D3DCCD1}">
-              <a14:hiddenFill xmlns:a14="http://schemas.microsoft.com/office/drawing/2010/main" xmlns:p="http://schemas.openxmlformats.org/presentationml/2006/main" xmlns:r="http://schemas.openxmlformats.org/officeDocument/2006/relationships" xmlns:a="http://schemas.openxmlformats.org/drawingml/2006/main" xmlns="">
+              <a14:hiddenFill xmlns="" xmlns:a="http://schemas.openxmlformats.org/drawingml/2006/main" xmlns:r="http://schemas.openxmlformats.org/officeDocument/2006/relationships" xmlns:p="http://schemas.openxmlformats.org/presentationml/2006/main" xmlns:a14="http://schemas.microsoft.com/office/drawing/2010/main" xmlns:mv="urn:schemas-microsoft-com:mac:vml" xmlns:mc="http://schemas.openxmlformats.org/markup-compatibility/2006">
                 <a:solidFill>
                   <a:srgbClr val="FFFFFF"/>
                 </a:solidFill>
               </a14:hiddenFill>
             </a:ext>
             <a:ext uri="{91240B29-F687-4f45-9708-019B960494DF}">
-              <a14:hiddenLine xmlns:a14="http://schemas.microsoft.com/office/drawing/2010/main" xmlns:p="http://schemas.openxmlformats.org/presentationml/2006/main" xmlns:r="http://schemas.openxmlformats.org/officeDocument/2006/relationships" xmlns:a="http://schemas.openxmlformats.org/drawingml/2006/main" xmlns="" w="9525">
+              <a14:hiddenLine xmlns="" xmlns:a="http://schemas.openxmlformats.org/drawingml/2006/main" xmlns:r="http://schemas.openxmlformats.org/officeDocument/2006/relationships" xmlns:p="http://schemas.openxmlformats.org/presentationml/2006/main" xmlns:a14="http://schemas.microsoft.com/office/drawing/2010/main" xmlns:mv="urn:schemas-microsoft-com:mac:vml" xmlns:mc="http://schemas.openxmlformats.org/markup-compatibility/2006" w="9525">
                 <a:solidFill>
                   <a:srgbClr val="000000"/>
                 </a:solidFill>
@@ -2423,7 +2423,7 @@
           <a:blip r:embed="rId13">
             <a:extLst>
               <a:ext uri="{28A0092B-C50C-407E-A947-70E740481C1C}">
-                <a14:useLocalDpi xmlns:a14="http://schemas.microsoft.com/office/drawing/2010/main" xmlns:p="http://schemas.openxmlformats.org/presentationml/2006/main" xmlns:r="http://schemas.openxmlformats.org/officeDocument/2006/relationships" xmlns:a="http://schemas.openxmlformats.org/drawingml/2006/main" xmlns="" val="0"/>
+                <a14:useLocalDpi xmlns="" xmlns:a="http://schemas.openxmlformats.org/drawingml/2006/main" xmlns:r="http://schemas.openxmlformats.org/officeDocument/2006/relationships" xmlns:p="http://schemas.openxmlformats.org/presentationml/2006/main" xmlns:a14="http://schemas.microsoft.com/office/drawing/2010/main" xmlns:mv="urn:schemas-microsoft-com:mac:vml" xmlns:mc="http://schemas.openxmlformats.org/markup-compatibility/2006" val="0"/>
               </a:ext>
             </a:extLst>
           </a:blip>
@@ -2446,14 +2446,14 @@
           </a:ln>
           <a:extLst>
             <a:ext uri="{909E8E84-426E-40dd-AFC4-6F175D3DCCD1}">
-              <a14:hiddenFill xmlns:a14="http://schemas.microsoft.com/office/drawing/2010/main" xmlns:p="http://schemas.openxmlformats.org/presentationml/2006/main" xmlns:r="http://schemas.openxmlformats.org/officeDocument/2006/relationships" xmlns:a="http://schemas.openxmlformats.org/drawingml/2006/main" xmlns="">
+              <a14:hiddenFill xmlns="" xmlns:a="http://schemas.openxmlformats.org/drawingml/2006/main" xmlns:r="http://schemas.openxmlformats.org/officeDocument/2006/relationships" xmlns:p="http://schemas.openxmlformats.org/presentationml/2006/main" xmlns:a14="http://schemas.microsoft.com/office/drawing/2010/main" xmlns:mv="urn:schemas-microsoft-com:mac:vml" xmlns:mc="http://schemas.openxmlformats.org/markup-compatibility/2006">
                 <a:solidFill>
                   <a:srgbClr val="FFFFFF"/>
                 </a:solidFill>
               </a14:hiddenFill>
             </a:ext>
             <a:ext uri="{91240B29-F687-4f45-9708-019B960494DF}">
-              <a14:hiddenLine xmlns:a14="http://schemas.microsoft.com/office/drawing/2010/main" xmlns:p="http://schemas.openxmlformats.org/presentationml/2006/main" xmlns:r="http://schemas.openxmlformats.org/officeDocument/2006/relationships" xmlns:a="http://schemas.openxmlformats.org/drawingml/2006/main" xmlns="" w="9525">
+              <a14:hiddenLine xmlns="" xmlns:a="http://schemas.openxmlformats.org/drawingml/2006/main" xmlns:r="http://schemas.openxmlformats.org/officeDocument/2006/relationships" xmlns:p="http://schemas.openxmlformats.org/presentationml/2006/main" xmlns:a14="http://schemas.microsoft.com/office/drawing/2010/main" xmlns:mv="urn:schemas-microsoft-com:mac:vml" xmlns:mc="http://schemas.openxmlformats.org/markup-compatibility/2006" w="9525">
                 <a:solidFill>
                   <a:srgbClr val="000000"/>
                 </a:solidFill>
@@ -3153,7 +3153,7 @@
     </p:spTree>
     <p:extLst>
       <p:ext uri="{BB962C8B-B14F-4D97-AF65-F5344CB8AC3E}">
-        <p14:creationId xmlns:p14="http://schemas.microsoft.com/office/powerpoint/2010/main" xmlns:p="http://schemas.openxmlformats.org/presentationml/2006/main" xmlns:r="http://schemas.openxmlformats.org/officeDocument/2006/relationships" xmlns:a="http://schemas.openxmlformats.org/drawingml/2006/main" xmlns="" val="4198014329"/>
+        <p14:creationId xmlns="" xmlns:a="http://schemas.openxmlformats.org/drawingml/2006/main" xmlns:r="http://schemas.openxmlformats.org/officeDocument/2006/relationships" xmlns:p="http://schemas.openxmlformats.org/presentationml/2006/main" xmlns:p14="http://schemas.microsoft.com/office/powerpoint/2010/main" xmlns:mv="urn:schemas-microsoft-com:mac:vml" xmlns:mc="http://schemas.openxmlformats.org/markup-compatibility/2006" val="4198014329"/>
       </p:ext>
     </p:extLst>
   </p:cSld>
@@ -3410,7 +3410,7 @@
     </p:spTree>
     <p:extLst>
       <p:ext uri="{BB962C8B-B14F-4D97-AF65-F5344CB8AC3E}">
-        <p14:creationId xmlns:p14="http://schemas.microsoft.com/office/powerpoint/2010/main" xmlns:p="http://schemas.openxmlformats.org/presentationml/2006/main" xmlns:r="http://schemas.openxmlformats.org/officeDocument/2006/relationships" xmlns:a="http://schemas.openxmlformats.org/drawingml/2006/main" xmlns="" val="1054991098"/>
+        <p14:creationId xmlns="" xmlns:a="http://schemas.openxmlformats.org/drawingml/2006/main" xmlns:r="http://schemas.openxmlformats.org/officeDocument/2006/relationships" xmlns:p="http://schemas.openxmlformats.org/presentationml/2006/main" xmlns:p14="http://schemas.microsoft.com/office/powerpoint/2010/main" xmlns:mv="urn:schemas-microsoft-com:mac:vml" xmlns:mc="http://schemas.openxmlformats.org/markup-compatibility/2006" val="1054991098"/>
       </p:ext>
     </p:extLst>
   </p:cSld>
@@ -3631,7 +3631,7 @@
     </p:spTree>
     <p:extLst>
       <p:ext uri="{BB962C8B-B14F-4D97-AF65-F5344CB8AC3E}">
-        <p14:creationId xmlns:p14="http://schemas.microsoft.com/office/powerpoint/2010/main" xmlns:p="http://schemas.openxmlformats.org/presentationml/2006/main" xmlns:r="http://schemas.openxmlformats.org/officeDocument/2006/relationships" xmlns:a="http://schemas.openxmlformats.org/drawingml/2006/main" xmlns="" val="2990765515"/>
+        <p14:creationId xmlns="" xmlns:a="http://schemas.openxmlformats.org/drawingml/2006/main" xmlns:r="http://schemas.openxmlformats.org/officeDocument/2006/relationships" xmlns:p="http://schemas.openxmlformats.org/presentationml/2006/main" xmlns:p14="http://schemas.microsoft.com/office/powerpoint/2010/main" xmlns:mv="urn:schemas-microsoft-com:mac:vml" xmlns:mc="http://schemas.openxmlformats.org/markup-compatibility/2006" val="2990765515"/>
       </p:ext>
     </p:extLst>
   </p:cSld>
@@ -3802,7 +3802,7 @@
     </p:spTree>
     <p:extLst>
       <p:ext uri="{BB962C8B-B14F-4D97-AF65-F5344CB8AC3E}">
-        <p14:creationId xmlns:p14="http://schemas.microsoft.com/office/powerpoint/2010/main" xmlns:p="http://schemas.openxmlformats.org/presentationml/2006/main" xmlns:r="http://schemas.openxmlformats.org/officeDocument/2006/relationships" xmlns:a="http://schemas.openxmlformats.org/drawingml/2006/main" xmlns="" val="1819968272"/>
+        <p14:creationId xmlns="" xmlns:a="http://schemas.openxmlformats.org/drawingml/2006/main" xmlns:r="http://schemas.openxmlformats.org/officeDocument/2006/relationships" xmlns:p="http://schemas.openxmlformats.org/presentationml/2006/main" xmlns:p14="http://schemas.microsoft.com/office/powerpoint/2010/main" xmlns:mv="urn:schemas-microsoft-com:mac:vml" xmlns:mc="http://schemas.openxmlformats.org/markup-compatibility/2006" val="1819968272"/>
       </p:ext>
     </p:extLst>
   </p:cSld>
@@ -3992,7 +3992,7 @@
     </p:spTree>
     <p:extLst>
       <p:ext uri="{BB962C8B-B14F-4D97-AF65-F5344CB8AC3E}">
-        <p14:creationId xmlns:p14="http://schemas.microsoft.com/office/powerpoint/2010/main" xmlns:p="http://schemas.openxmlformats.org/presentationml/2006/main" xmlns:r="http://schemas.openxmlformats.org/officeDocument/2006/relationships" xmlns:a="http://schemas.openxmlformats.org/drawingml/2006/main" xmlns="" val="4246708240"/>
+        <p14:creationId xmlns="" xmlns:a="http://schemas.openxmlformats.org/drawingml/2006/main" xmlns:r="http://schemas.openxmlformats.org/officeDocument/2006/relationships" xmlns:p="http://schemas.openxmlformats.org/presentationml/2006/main" xmlns:p14="http://schemas.microsoft.com/office/powerpoint/2010/main" xmlns:mv="urn:schemas-microsoft-com:mac:vml" xmlns:mc="http://schemas.openxmlformats.org/markup-compatibility/2006" val="4246708240"/>
       </p:ext>
     </p:extLst>
   </p:cSld>
@@ -4111,7 +4111,7 @@
     </p:spTree>
     <p:extLst>
       <p:ext uri="{BB962C8B-B14F-4D97-AF65-F5344CB8AC3E}">
-        <p14:creationId xmlns:p14="http://schemas.microsoft.com/office/powerpoint/2010/main" xmlns:p="http://schemas.openxmlformats.org/presentationml/2006/main" xmlns:r="http://schemas.openxmlformats.org/officeDocument/2006/relationships" xmlns:a="http://schemas.openxmlformats.org/drawingml/2006/main" xmlns="" val="2184776519"/>
+        <p14:creationId xmlns="" xmlns:a="http://schemas.openxmlformats.org/drawingml/2006/main" xmlns:r="http://schemas.openxmlformats.org/officeDocument/2006/relationships" xmlns:p="http://schemas.openxmlformats.org/presentationml/2006/main" xmlns:p14="http://schemas.microsoft.com/office/powerpoint/2010/main" xmlns:mv="urn:schemas-microsoft-com:mac:vml" xmlns:mc="http://schemas.openxmlformats.org/markup-compatibility/2006" val="2184776519"/>
       </p:ext>
     </p:extLst>
   </p:cSld>
@@ -4262,7 +4262,7 @@
           <a:blip r:embed="rId2">
             <a:extLst>
               <a:ext uri="{28A0092B-C50C-407E-A947-70E740481C1C}">
-                <a14:useLocalDpi xmlns:a14="http://schemas.microsoft.com/office/drawing/2010/main" xmlns:p="http://schemas.openxmlformats.org/presentationml/2006/main" xmlns:r="http://schemas.openxmlformats.org/officeDocument/2006/relationships" xmlns:a="http://schemas.openxmlformats.org/drawingml/2006/main" xmlns="" val="0"/>
+                <a14:useLocalDpi xmlns="" xmlns:a="http://schemas.openxmlformats.org/drawingml/2006/main" xmlns:r="http://schemas.openxmlformats.org/officeDocument/2006/relationships" xmlns:p="http://schemas.openxmlformats.org/presentationml/2006/main" xmlns:a14="http://schemas.microsoft.com/office/drawing/2010/main" xmlns:mv="urn:schemas-microsoft-com:mac:vml" xmlns:mc="http://schemas.openxmlformats.org/markup-compatibility/2006" val="0"/>
               </a:ext>
             </a:extLst>
           </a:blip>
@@ -4283,7 +4283,7 @@
     </p:spTree>
     <p:extLst>
       <p:ext uri="{BB962C8B-B14F-4D97-AF65-F5344CB8AC3E}">
-        <p14:creationId xmlns:p14="http://schemas.microsoft.com/office/powerpoint/2010/main" xmlns:p="http://schemas.openxmlformats.org/presentationml/2006/main" xmlns:r="http://schemas.openxmlformats.org/officeDocument/2006/relationships" xmlns:a="http://schemas.openxmlformats.org/drawingml/2006/main" xmlns="" val="2330916061"/>
+        <p14:creationId xmlns="" xmlns:a="http://schemas.openxmlformats.org/drawingml/2006/main" xmlns:r="http://schemas.openxmlformats.org/officeDocument/2006/relationships" xmlns:p="http://schemas.openxmlformats.org/presentationml/2006/main" xmlns:p14="http://schemas.microsoft.com/office/powerpoint/2010/main" xmlns:mv="urn:schemas-microsoft-com:mac:vml" xmlns:mc="http://schemas.openxmlformats.org/markup-compatibility/2006" val="2330916061"/>
       </p:ext>
     </p:extLst>
   </p:cSld>
@@ -4355,7 +4355,7 @@
           <a:blip r:embed="rId2">
             <a:extLst>
               <a:ext uri="{28A0092B-C50C-407E-A947-70E740481C1C}">
-                <a14:useLocalDpi xmlns:a14="http://schemas.microsoft.com/office/drawing/2010/main" xmlns:p="http://schemas.openxmlformats.org/presentationml/2006/main" xmlns:r="http://schemas.openxmlformats.org/officeDocument/2006/relationships" xmlns:a="http://schemas.openxmlformats.org/drawingml/2006/main" xmlns="" val="0"/>
+                <a14:useLocalDpi xmlns="" xmlns:a="http://schemas.openxmlformats.org/drawingml/2006/main" xmlns:r="http://schemas.openxmlformats.org/officeDocument/2006/relationships" xmlns:p="http://schemas.openxmlformats.org/presentationml/2006/main" xmlns:a14="http://schemas.microsoft.com/office/drawing/2010/main" xmlns:mv="urn:schemas-microsoft-com:mac:vml" xmlns:mc="http://schemas.openxmlformats.org/markup-compatibility/2006" val="0"/>
               </a:ext>
             </a:extLst>
           </a:blip>
@@ -4376,7 +4376,7 @@
     </p:spTree>
     <p:extLst>
       <p:ext uri="{BB962C8B-B14F-4D97-AF65-F5344CB8AC3E}">
-        <p14:creationId xmlns:p14="http://schemas.microsoft.com/office/powerpoint/2010/main" xmlns:p="http://schemas.openxmlformats.org/presentationml/2006/main" xmlns:r="http://schemas.openxmlformats.org/officeDocument/2006/relationships" xmlns:a="http://schemas.openxmlformats.org/drawingml/2006/main" xmlns="" val="3745986714"/>
+        <p14:creationId xmlns="" xmlns:a="http://schemas.openxmlformats.org/drawingml/2006/main" xmlns:r="http://schemas.openxmlformats.org/officeDocument/2006/relationships" xmlns:p="http://schemas.openxmlformats.org/presentationml/2006/main" xmlns:p14="http://schemas.microsoft.com/office/powerpoint/2010/main" xmlns:mv="urn:schemas-microsoft-com:mac:vml" xmlns:mc="http://schemas.openxmlformats.org/markup-compatibility/2006" val="3745986714"/>
       </p:ext>
     </p:extLst>
   </p:cSld>
@@ -4567,7 +4567,7 @@
     </p:spTree>
     <p:extLst>
       <p:ext uri="{BB962C8B-B14F-4D97-AF65-F5344CB8AC3E}">
-        <p14:creationId xmlns:p14="http://schemas.microsoft.com/office/powerpoint/2010/main" xmlns:p="http://schemas.openxmlformats.org/presentationml/2006/main" xmlns:r="http://schemas.openxmlformats.org/officeDocument/2006/relationships" xmlns:a="http://schemas.openxmlformats.org/drawingml/2006/main" xmlns="" val="703293322"/>
+        <p14:creationId xmlns="" xmlns:a="http://schemas.openxmlformats.org/drawingml/2006/main" xmlns:r="http://schemas.openxmlformats.org/officeDocument/2006/relationships" xmlns:p="http://schemas.openxmlformats.org/presentationml/2006/main" xmlns:p14="http://schemas.microsoft.com/office/powerpoint/2010/main" xmlns:mv="urn:schemas-microsoft-com:mac:vml" xmlns:mc="http://schemas.openxmlformats.org/markup-compatibility/2006" val="703293322"/>
       </p:ext>
     </p:extLst>
   </p:cSld>
@@ -4729,7 +4729,7 @@
     </p:spTree>
     <p:extLst>
       <p:ext uri="{BB962C8B-B14F-4D97-AF65-F5344CB8AC3E}">
-        <p14:creationId xmlns:p14="http://schemas.microsoft.com/office/powerpoint/2010/main" xmlns:p="http://schemas.openxmlformats.org/presentationml/2006/main" xmlns:r="http://schemas.openxmlformats.org/officeDocument/2006/relationships" xmlns:a="http://schemas.openxmlformats.org/drawingml/2006/main" xmlns="" val="3137281573"/>
+        <p14:creationId xmlns="" xmlns:a="http://schemas.openxmlformats.org/drawingml/2006/main" xmlns:r="http://schemas.openxmlformats.org/officeDocument/2006/relationships" xmlns:p="http://schemas.openxmlformats.org/presentationml/2006/main" xmlns:p14="http://schemas.microsoft.com/office/powerpoint/2010/main" xmlns:mv="urn:schemas-microsoft-com:mac:vml" xmlns:mc="http://schemas.openxmlformats.org/markup-compatibility/2006" val="3137281573"/>
       </p:ext>
     </p:extLst>
   </p:cSld>
@@ -4871,7 +4871,7 @@
           <a:blip r:embed="rId2">
             <a:extLst>
               <a:ext uri="{28A0092B-C50C-407E-A947-70E740481C1C}">
-                <a14:useLocalDpi xmlns:a14="http://schemas.microsoft.com/office/drawing/2010/main" xmlns:p="http://schemas.openxmlformats.org/presentationml/2006/main" xmlns:r="http://schemas.openxmlformats.org/officeDocument/2006/relationships" xmlns:a="http://schemas.openxmlformats.org/drawingml/2006/main" xmlns="" val="0"/>
+                <a14:useLocalDpi xmlns="" xmlns:a="http://schemas.openxmlformats.org/drawingml/2006/main" xmlns:r="http://schemas.openxmlformats.org/officeDocument/2006/relationships" xmlns:p="http://schemas.openxmlformats.org/presentationml/2006/main" xmlns:a14="http://schemas.microsoft.com/office/drawing/2010/main" xmlns:mv="urn:schemas-microsoft-com:mac:vml" xmlns:mc="http://schemas.openxmlformats.org/markup-compatibility/2006" val="0"/>
               </a:ext>
             </a:extLst>
           </a:blip>
@@ -4895,14 +4895,14 @@
           <a:effectLst/>
           <a:extLst>
             <a:ext uri="{909E8E84-426E-40dd-AFC4-6F175D3DCCD1}">
-              <a14:hiddenFill xmlns:a14="http://schemas.microsoft.com/office/drawing/2010/main" xmlns:p="http://schemas.openxmlformats.org/presentationml/2006/main" xmlns:r="http://schemas.openxmlformats.org/officeDocument/2006/relationships" xmlns:a="http://schemas.openxmlformats.org/drawingml/2006/main" xmlns="">
+              <a14:hiddenFill xmlns="" xmlns:a="http://schemas.openxmlformats.org/drawingml/2006/main" xmlns:r="http://schemas.openxmlformats.org/officeDocument/2006/relationships" xmlns:p="http://schemas.openxmlformats.org/presentationml/2006/main" xmlns:a14="http://schemas.microsoft.com/office/drawing/2010/main" xmlns:mv="urn:schemas-microsoft-com:mac:vml" xmlns:mc="http://schemas.openxmlformats.org/markup-compatibility/2006">
                 <a:solidFill>
                   <a:schemeClr val="accent1"/>
                 </a:solidFill>
               </a14:hiddenFill>
             </a:ext>
             <a:ext uri="{91240B29-F687-4f45-9708-019B960494DF}">
-              <a14:hiddenLine xmlns:a14="http://schemas.microsoft.com/office/drawing/2010/main" xmlns:p="http://schemas.openxmlformats.org/presentationml/2006/main" xmlns:r="http://schemas.openxmlformats.org/officeDocument/2006/relationships" xmlns:a="http://schemas.openxmlformats.org/drawingml/2006/main" xmlns="" w="9525">
+              <a14:hiddenLine xmlns="" xmlns:a="http://schemas.openxmlformats.org/drawingml/2006/main" xmlns:r="http://schemas.openxmlformats.org/officeDocument/2006/relationships" xmlns:p="http://schemas.openxmlformats.org/presentationml/2006/main" xmlns:a14="http://schemas.microsoft.com/office/drawing/2010/main" xmlns:mv="urn:schemas-microsoft-com:mac:vml" xmlns:mc="http://schemas.openxmlformats.org/markup-compatibility/2006" w="9525">
                 <a:solidFill>
                   <a:schemeClr val="tx1"/>
                 </a:solidFill>
@@ -4912,7 +4912,7 @@
               </a14:hiddenLine>
             </a:ext>
             <a:ext uri="{AF507438-7753-43e0-B8FC-AC1667EBCBE1}">
-              <a14:hiddenEffects xmlns:a14="http://schemas.microsoft.com/office/drawing/2010/main" xmlns:p="http://schemas.openxmlformats.org/presentationml/2006/main" xmlns:r="http://schemas.openxmlformats.org/officeDocument/2006/relationships" xmlns:a="http://schemas.openxmlformats.org/drawingml/2006/main" xmlns="">
+              <a14:hiddenEffects xmlns="" xmlns:a="http://schemas.openxmlformats.org/drawingml/2006/main" xmlns:r="http://schemas.openxmlformats.org/officeDocument/2006/relationships" xmlns:p="http://schemas.openxmlformats.org/presentationml/2006/main" xmlns:a14="http://schemas.microsoft.com/office/drawing/2010/main" xmlns:mv="urn:schemas-microsoft-com:mac:vml" xmlns:mc="http://schemas.openxmlformats.org/markup-compatibility/2006">
                 <a:effectLst>
                   <a:outerShdw dist="35921" dir="2700000" algn="ctr" rotWithShape="0">
                     <a:schemeClr val="bg2"/>
@@ -4926,7 +4926,7 @@
     </p:spTree>
     <p:extLst>
       <p:ext uri="{BB962C8B-B14F-4D97-AF65-F5344CB8AC3E}">
-        <p14:creationId xmlns:p14="http://schemas.microsoft.com/office/powerpoint/2010/main" xmlns:p="http://schemas.openxmlformats.org/presentationml/2006/main" xmlns:r="http://schemas.openxmlformats.org/officeDocument/2006/relationships" xmlns:a="http://schemas.openxmlformats.org/drawingml/2006/main" xmlns="" val="1539374397"/>
+        <p14:creationId xmlns="" xmlns:a="http://schemas.openxmlformats.org/drawingml/2006/main" xmlns:r="http://schemas.openxmlformats.org/officeDocument/2006/relationships" xmlns:p="http://schemas.openxmlformats.org/presentationml/2006/main" xmlns:p14="http://schemas.microsoft.com/office/powerpoint/2010/main" xmlns:mv="urn:schemas-microsoft-com:mac:vml" xmlns:mc="http://schemas.openxmlformats.org/markup-compatibility/2006" val="1539374397"/>
       </p:ext>
     </p:extLst>
   </p:cSld>
@@ -5071,13 +5071,20 @@
     </p:spTree>
     <p:extLst>
       <p:ext uri="{BB962C8B-B14F-4D97-AF65-F5344CB8AC3E}">
-        <p14:creationId xmlns:p14="http://schemas.microsoft.com/office/powerpoint/2010/main" xmlns:p="http://schemas.openxmlformats.org/presentationml/2006/main" xmlns:r="http://schemas.openxmlformats.org/officeDocument/2006/relationships" xmlns:a="http://schemas.openxmlformats.org/drawingml/2006/main" xmlns="" val="1614482664"/>
+        <p14:creationId xmlns="" xmlns:a="http://schemas.openxmlformats.org/drawingml/2006/main" xmlns:r="http://schemas.openxmlformats.org/officeDocument/2006/relationships" xmlns:p="http://schemas.openxmlformats.org/presentationml/2006/main" xmlns:p14="http://schemas.microsoft.com/office/powerpoint/2010/main" xmlns:mv="urn:schemas-microsoft-com:mac:vml" xmlns:mc="http://schemas.openxmlformats.org/markup-compatibility/2006" val="1614482664"/>
       </p:ext>
     </p:extLst>
   </p:cSld>
   <p:clrMapOvr>
     <a:masterClrMapping/>
   </p:clrMapOvr>
+  <p:timing>
+    <p:tnLst>
+      <p:par>
+        <p:cTn id="1" dur="indefinite" restart="never" nodeType="tmRoot"/>
+      </p:par>
+    </p:tnLst>
+  </p:timing>
 </p:sld>
 </file>
 
@@ -5249,7 +5256,7 @@
     </p:spTree>
     <p:extLst>
       <p:ext uri="{BB962C8B-B14F-4D97-AF65-F5344CB8AC3E}">
-        <p14:creationId xmlns:p14="http://schemas.microsoft.com/office/powerpoint/2010/main" xmlns:p="http://schemas.openxmlformats.org/presentationml/2006/main" xmlns:r="http://schemas.openxmlformats.org/officeDocument/2006/relationships" xmlns:a="http://schemas.openxmlformats.org/drawingml/2006/main" xmlns="" val="3789203438"/>
+        <p14:creationId xmlns="" xmlns:a="http://schemas.openxmlformats.org/drawingml/2006/main" xmlns:r="http://schemas.openxmlformats.org/officeDocument/2006/relationships" xmlns:p="http://schemas.openxmlformats.org/presentationml/2006/main" xmlns:p14="http://schemas.microsoft.com/office/powerpoint/2010/main" xmlns:mv="urn:schemas-microsoft-com:mac:vml" xmlns:mc="http://schemas.openxmlformats.org/markup-compatibility/2006" val="3789203438"/>
       </p:ext>
     </p:extLst>
   </p:cSld>
@@ -5565,7 +5572,7 @@
     </p:spTree>
     <p:extLst>
       <p:ext uri="{BB962C8B-B14F-4D97-AF65-F5344CB8AC3E}">
-        <p14:creationId xmlns:p14="http://schemas.microsoft.com/office/powerpoint/2010/main" xmlns:p="http://schemas.openxmlformats.org/presentationml/2006/main" xmlns:r="http://schemas.openxmlformats.org/officeDocument/2006/relationships" xmlns:a="http://schemas.openxmlformats.org/drawingml/2006/main" xmlns="" val="3537326466"/>
+        <p14:creationId xmlns="" xmlns:a="http://schemas.openxmlformats.org/drawingml/2006/main" xmlns:r="http://schemas.openxmlformats.org/officeDocument/2006/relationships" xmlns:p="http://schemas.openxmlformats.org/presentationml/2006/main" xmlns:p14="http://schemas.microsoft.com/office/powerpoint/2010/main" xmlns:mv="urn:schemas-microsoft-com:mac:vml" xmlns:mc="http://schemas.openxmlformats.org/markup-compatibility/2006" val="3537326466"/>
       </p:ext>
     </p:extLst>
   </p:cSld>
@@ -5734,7 +5741,7 @@
     </p:spTree>
     <p:extLst>
       <p:ext uri="{BB962C8B-B14F-4D97-AF65-F5344CB8AC3E}">
-        <p14:creationId xmlns:p14="http://schemas.microsoft.com/office/powerpoint/2010/main" xmlns:p="http://schemas.openxmlformats.org/presentationml/2006/main" xmlns:r="http://schemas.openxmlformats.org/officeDocument/2006/relationships" xmlns:a="http://schemas.openxmlformats.org/drawingml/2006/main" xmlns="" val="1194156412"/>
+        <p14:creationId xmlns="" xmlns:a="http://schemas.openxmlformats.org/drawingml/2006/main" xmlns:r="http://schemas.openxmlformats.org/officeDocument/2006/relationships" xmlns:p="http://schemas.openxmlformats.org/presentationml/2006/main" xmlns:p14="http://schemas.microsoft.com/office/powerpoint/2010/main" xmlns:mv="urn:schemas-microsoft-com:mac:vml" xmlns:mc="http://schemas.openxmlformats.org/markup-compatibility/2006" val="1194156412"/>
       </p:ext>
     </p:extLst>
   </p:cSld>
@@ -5818,7 +5825,7 @@
     </p:spTree>
     <p:extLst>
       <p:ext uri="{BB962C8B-B14F-4D97-AF65-F5344CB8AC3E}">
-        <p14:creationId xmlns:p14="http://schemas.microsoft.com/office/powerpoint/2010/main" xmlns:p="http://schemas.openxmlformats.org/presentationml/2006/main" xmlns:r="http://schemas.openxmlformats.org/officeDocument/2006/relationships" xmlns:a="http://schemas.openxmlformats.org/drawingml/2006/main" xmlns="" val="1958107778"/>
+        <p14:creationId xmlns="" xmlns:a="http://schemas.openxmlformats.org/drawingml/2006/main" xmlns:r="http://schemas.openxmlformats.org/officeDocument/2006/relationships" xmlns:p="http://schemas.openxmlformats.org/presentationml/2006/main" xmlns:p14="http://schemas.microsoft.com/office/powerpoint/2010/main" xmlns:mv="urn:schemas-microsoft-com:mac:vml" xmlns:mc="http://schemas.openxmlformats.org/markup-compatibility/2006" val="1958107778"/>
       </p:ext>
     </p:extLst>
   </p:cSld>

</xml_diff>